<commit_message>
Deployed c06eaf4 with MkDocs version: 1.6.0
</commit_message>
<xml_diff>
--- a/presentation_v2.pptx
+++ b/presentation_v2.pptx
@@ -5,10 +5,10 @@
     <p:sldMasterId id="2147483648" r:id="rId4"/>
   </p:sldMasterIdLst>
   <p:notesMasterIdLst>
-    <p:notesMasterId r:id="rId18"/>
+    <p:notesMasterId r:id="rId19"/>
   </p:notesMasterIdLst>
   <p:handoutMasterIdLst>
-    <p:handoutMasterId r:id="rId19"/>
+    <p:handoutMasterId r:id="rId20"/>
   </p:handoutMasterIdLst>
   <p:sldIdLst>
     <p:sldId id="256" r:id="rId5"/>
@@ -18,12 +18,13 @@
     <p:sldId id="257" r:id="rId9"/>
     <p:sldId id="258" r:id="rId10"/>
     <p:sldId id="261" r:id="rId11"/>
-    <p:sldId id="265" r:id="rId12"/>
-    <p:sldId id="269" r:id="rId13"/>
-    <p:sldId id="270" r:id="rId14"/>
-    <p:sldId id="271" r:id="rId15"/>
-    <p:sldId id="272" r:id="rId16"/>
-    <p:sldId id="264" r:id="rId17"/>
+    <p:sldId id="275" r:id="rId12"/>
+    <p:sldId id="265" r:id="rId13"/>
+    <p:sldId id="269" r:id="rId14"/>
+    <p:sldId id="270" r:id="rId15"/>
+    <p:sldId id="271" r:id="rId16"/>
+    <p:sldId id="272" r:id="rId17"/>
+    <p:sldId id="264" r:id="rId18"/>
   </p:sldIdLst>
   <p:sldSz cx="12192000" cy="6858000"/>
   <p:notesSz cx="6858000" cy="9144000"/>
@@ -5222,7 +5223,7 @@
           <p:cNvPr id="4" name="Content Placeholder 3">
             <a:extLst>
               <a:ext uri="{FF2B5EF4-FFF2-40B4-BE49-F238E27FC236}">
-                <a16:creationId xmlns:a16="http://schemas.microsoft.com/office/drawing/2014/main" id="{4297A4A4-C8F8-12BA-65F5-A78989594B3C}"/>
+                <a16:creationId xmlns:a16="http://schemas.microsoft.com/office/drawing/2014/main" id="{8C18B36D-EC6F-BEA4-D679-4B9FA4F88FA3}"/>
               </a:ext>
             </a:extLst>
           </p:cNvPr>
@@ -5454,7 +5455,13 @@
           <a:p>
             <a:r>
               <a:rPr lang="en-US" dirty="0"/>
-              <a:t>At their most complex, some combinations of variables exhibit highly non-linear structures where more complex techniques such as basis expansions and cubic splines may be best for determining decision boundaries between classes</a:t>
+              <a:t>Other combinations of data appear to define non-linear boundaries between PHA classifications. </a:t>
+            </a:r>
+          </a:p>
+          <a:p>
+            <a:r>
+              <a:rPr lang="en-US" dirty="0"/>
+              <a:t>Non-linear models such as QDA may be able to separate PHAs</a:t>
             </a:r>
           </a:p>
         </p:txBody>
@@ -5462,7 +5469,7 @@
     </p:spTree>
     <p:extLst>
       <p:ext uri="{BB962C8B-B14F-4D97-AF65-F5344CB8AC3E}">
-        <p14:creationId xmlns:p14="http://schemas.microsoft.com/office/powerpoint/2010/main" val="1715884256"/>
+        <p14:creationId xmlns:p14="http://schemas.microsoft.com/office/powerpoint/2010/main" val="2903172297"/>
       </p:ext>
     </p:extLst>
   </p:cSld>
@@ -5527,7 +5534,7 @@
           <p:cNvPr id="4" name="Content Placeholder 3">
             <a:extLst>
               <a:ext uri="{FF2B5EF4-FFF2-40B4-BE49-F238E27FC236}">
-                <a16:creationId xmlns:a16="http://schemas.microsoft.com/office/drawing/2014/main" id="{F7E723E2-69F1-A3D3-11F7-A5619B8C5937}"/>
+                <a16:creationId xmlns:a16="http://schemas.microsoft.com/office/drawing/2014/main" id="{4297A4A4-C8F8-12BA-65F5-A78989594B3C}"/>
               </a:ext>
             </a:extLst>
           </p:cNvPr>
@@ -5545,8 +5552,8 @@
         </p:blipFill>
         <p:spPr>
           <a:xfrm>
-            <a:off x="1242020" y="1825625"/>
-            <a:ext cx="5439172" cy="4351338"/>
+            <a:off x="838200" y="2127250"/>
+            <a:ext cx="6246813" cy="3748087"/>
           </a:xfrm>
         </p:spPr>
       </p:pic>
@@ -5759,13 +5766,7 @@
           <a:p>
             <a:r>
               <a:rPr lang="en-US" dirty="0"/>
-              <a:t>Models with 2 variables are naturally more simplistic than their higher dimensional equivalents</a:t>
-            </a:r>
-          </a:p>
-          <a:p>
-            <a:r>
-              <a:rPr lang="en-US" dirty="0"/>
-              <a:t>We explore higher dimensional models of classification to determine if better results exist</a:t>
+              <a:t>At their most complex, some combinations of variables exhibit highly non-linear structures where more complex techniques such as basis expansions and cubic splines may be best for determining decision boundaries between classes</a:t>
             </a:r>
           </a:p>
         </p:txBody>
@@ -5773,7 +5774,7 @@
     </p:spTree>
     <p:extLst>
       <p:ext uri="{BB962C8B-B14F-4D97-AF65-F5344CB8AC3E}">
-        <p14:creationId xmlns:p14="http://schemas.microsoft.com/office/powerpoint/2010/main" val="3980015257"/>
+        <p14:creationId xmlns:p14="http://schemas.microsoft.com/office/powerpoint/2010/main" val="1715884256"/>
       </p:ext>
     </p:extLst>
   </p:cSld>
@@ -5828,13 +5829,8 @@
           <a:p>
             <a:r>
               <a:rPr lang="en-US" dirty="0"/>
-              <a:t>What About Latent Data? </a:t>
-            </a:r>
-            <a:r>
-              <a:rPr lang="en-US"/>
-              <a:t>FINISH ME</a:t>
-            </a:r>
-            <a:endParaRPr lang="en-US" dirty="0"/>
+              <a:t>Potential Classification Problems</a:t>
+            </a:r>
           </a:p>
         </p:txBody>
       </p:sp>
@@ -6075,7 +6071,13 @@
           <a:p>
             <a:r>
               <a:rPr lang="en-US" dirty="0"/>
-              <a:t>The previous slides explored possible classification algorithms where our training data is already labeled.  What about</a:t>
+              <a:t>Models with 2 variables are naturally more simplistic than their higher dimensional equivalents</a:t>
+            </a:r>
+          </a:p>
+          <a:p>
+            <a:r>
+              <a:rPr lang="en-US" dirty="0"/>
+              <a:t>We explore higher dimensional models of classification to determine if better results exist</a:t>
             </a:r>
           </a:p>
         </p:txBody>
@@ -6083,7 +6085,7 @@
     </p:spTree>
     <p:extLst>
       <p:ext uri="{BB962C8B-B14F-4D97-AF65-F5344CB8AC3E}">
-        <p14:creationId xmlns:p14="http://schemas.microsoft.com/office/powerpoint/2010/main" val="1340280693"/>
+        <p14:creationId xmlns:p14="http://schemas.microsoft.com/office/powerpoint/2010/main" val="3980015257"/>
       </p:ext>
     </p:extLst>
   </p:cSld>
@@ -6115,7 +6117,7 @@
           <p:cNvPr id="2" name="Title 1">
             <a:extLst>
               <a:ext uri="{FF2B5EF4-FFF2-40B4-BE49-F238E27FC236}">
-                <a16:creationId xmlns:a16="http://schemas.microsoft.com/office/drawing/2014/main" id="{4243BD5A-CCE5-8B3F-8BD4-786450B9BF0E}"/>
+                <a16:creationId xmlns:a16="http://schemas.microsoft.com/office/drawing/2014/main" id="{A88C9361-4F05-F26B-DDFC-BE1BB44291AD}"/>
               </a:ext>
             </a:extLst>
           </p:cNvPr>
@@ -6126,40 +6128,361 @@
             <p:ph type="title"/>
           </p:nvPr>
         </p:nvSpPr>
-        <p:spPr/>
+        <p:spPr>
+          <a:xfrm>
+            <a:off x="838200" y="160336"/>
+            <a:ext cx="10891118" cy="1325563"/>
+          </a:xfrm>
+        </p:spPr>
         <p:txBody>
           <a:bodyPr/>
           <a:lstStyle/>
           <a:p>
             <a:r>
               <a:rPr lang="en-US" dirty="0"/>
-              <a:t>Assumptions &amp; Challenges</a:t>
-            </a:r>
-          </a:p>
-        </p:txBody>
-      </p:sp>
-      <p:sp>
-        <p:nvSpPr>
-          <p:cNvPr id="3" name="Content Placeholder 2">
-            <a:extLst>
-              <a:ext uri="{FF2B5EF4-FFF2-40B4-BE49-F238E27FC236}">
-                <a16:creationId xmlns:a16="http://schemas.microsoft.com/office/drawing/2014/main" id="{9C4246EB-E0C4-0874-58FD-DEF0A70E005A}"/>
-              </a:ext>
-            </a:extLst>
-          </p:cNvPr>
-          <p:cNvSpPr>
-            <a:spLocks noGrp="1"/>
-          </p:cNvSpPr>
+              <a:t>What About Latent Data?</a:t>
+            </a:r>
+          </a:p>
+        </p:txBody>
+      </p:sp>
+      <p:pic>
+        <p:nvPicPr>
+          <p:cNvPr id="4" name="Content Placeholder 3">
+            <a:extLst>
+              <a:ext uri="{FF2B5EF4-FFF2-40B4-BE49-F238E27FC236}">
+                <a16:creationId xmlns:a16="http://schemas.microsoft.com/office/drawing/2014/main" id="{F7E723E2-69F1-A3D3-11F7-A5619B8C5937}"/>
+              </a:ext>
+            </a:extLst>
+          </p:cNvPr>
+          <p:cNvPicPr>
+            <a:picLocks noGrp="1" noChangeAspect="1"/>
+          </p:cNvPicPr>
           <p:nvPr>
             <p:ph idx="1"/>
           </p:nvPr>
-        </p:nvSpPr>
-        <p:spPr/>
+        </p:nvPicPr>
+        <p:blipFill>
+          <a:blip r:embed="rId2"/>
+          <a:srcRect/>
+          <a:stretch/>
+        </p:blipFill>
+        <p:spPr>
+          <a:xfrm>
+            <a:off x="1242020" y="1825625"/>
+            <a:ext cx="5439172" cy="4351338"/>
+          </a:xfrm>
+        </p:spPr>
+      </p:pic>
+      <p:sp>
+        <p:nvSpPr>
+          <p:cNvPr id="20" name="Content Placeholder 2">
+            <a:extLst>
+              <a:ext uri="{FF2B5EF4-FFF2-40B4-BE49-F238E27FC236}">
+                <a16:creationId xmlns:a16="http://schemas.microsoft.com/office/drawing/2014/main" id="{BA63EDEC-7C0C-D436-3396-7DA950F78EDD}"/>
+              </a:ext>
+            </a:extLst>
+          </p:cNvPr>
+          <p:cNvSpPr txBox="1">
+            <a:spLocks/>
+          </p:cNvSpPr>
+          <p:nvPr/>
+        </p:nvSpPr>
+        <p:spPr>
+          <a:xfrm>
+            <a:off x="7420199" y="1825625"/>
+            <a:ext cx="4244788" cy="4351338"/>
+          </a:xfrm>
+          <a:prstGeom prst="rect">
+            <a:avLst/>
+          </a:prstGeom>
+        </p:spPr>
+        <p:txBody>
+          <a:bodyPr vert="horz" lIns="91440" tIns="45720" rIns="91440" bIns="45720" rtlCol="0">
+            <a:normAutofit/>
+          </a:bodyPr>
+          <a:lstStyle>
+            <a:lvl1pPr marL="228600" indent="-228600" algn="l" defTabSz="914400" rtl="0" eaLnBrk="1" latinLnBrk="0" hangingPunct="1">
+              <a:lnSpc>
+                <a:spcPct val="90000"/>
+              </a:lnSpc>
+              <a:spcBef>
+                <a:spcPts val="1000"/>
+              </a:spcBef>
+              <a:buClr>
+                <a:schemeClr val="accent5"/>
+              </a:buClr>
+              <a:buFont typeface="Wingdings" panose="05000000000000000000" pitchFamily="2" charset="2"/>
+              <a:buChar char="§"/>
+              <a:defRPr sz="2800" kern="1200">
+                <a:solidFill>
+                  <a:schemeClr val="bg1"/>
+                </a:solidFill>
+                <a:latin typeface="+mn-lt"/>
+                <a:ea typeface="+mn-ea"/>
+                <a:cs typeface="+mn-cs"/>
+              </a:defRPr>
+            </a:lvl1pPr>
+            <a:lvl2pPr marL="685800" indent="-228600" algn="l" defTabSz="914400" rtl="0" eaLnBrk="1" latinLnBrk="0" hangingPunct="1">
+              <a:lnSpc>
+                <a:spcPct val="90000"/>
+              </a:lnSpc>
+              <a:spcBef>
+                <a:spcPts val="500"/>
+              </a:spcBef>
+              <a:buClr>
+                <a:schemeClr val="accent5"/>
+              </a:buClr>
+              <a:buFont typeface="Wingdings" panose="05000000000000000000" pitchFamily="2" charset="2"/>
+              <a:buChar char="§"/>
+              <a:defRPr sz="2400" kern="1200">
+                <a:solidFill>
+                  <a:schemeClr val="bg1"/>
+                </a:solidFill>
+                <a:latin typeface="+mn-lt"/>
+                <a:ea typeface="+mn-ea"/>
+                <a:cs typeface="+mn-cs"/>
+              </a:defRPr>
+            </a:lvl2pPr>
+            <a:lvl3pPr marL="1143000" indent="-228600" algn="l" defTabSz="914400" rtl="0" eaLnBrk="1" latinLnBrk="0" hangingPunct="1">
+              <a:lnSpc>
+                <a:spcPct val="90000"/>
+              </a:lnSpc>
+              <a:spcBef>
+                <a:spcPts val="500"/>
+              </a:spcBef>
+              <a:buClr>
+                <a:schemeClr val="accent5"/>
+              </a:buClr>
+              <a:buFont typeface="Wingdings" panose="05000000000000000000" pitchFamily="2" charset="2"/>
+              <a:buChar char="§"/>
+              <a:defRPr sz="2000" kern="1200">
+                <a:solidFill>
+                  <a:schemeClr val="bg1"/>
+                </a:solidFill>
+                <a:latin typeface="+mn-lt"/>
+                <a:ea typeface="+mn-ea"/>
+                <a:cs typeface="+mn-cs"/>
+              </a:defRPr>
+            </a:lvl3pPr>
+            <a:lvl4pPr marL="1600200" indent="-228600" algn="l" defTabSz="914400" rtl="0" eaLnBrk="1" latinLnBrk="0" hangingPunct="1">
+              <a:lnSpc>
+                <a:spcPct val="90000"/>
+              </a:lnSpc>
+              <a:spcBef>
+                <a:spcPts val="500"/>
+              </a:spcBef>
+              <a:buClr>
+                <a:schemeClr val="accent5"/>
+              </a:buClr>
+              <a:buFont typeface="Wingdings" panose="05000000000000000000" pitchFamily="2" charset="2"/>
+              <a:buChar char="§"/>
+              <a:defRPr sz="1800" kern="1200">
+                <a:solidFill>
+                  <a:schemeClr val="bg1"/>
+                </a:solidFill>
+                <a:latin typeface="+mn-lt"/>
+                <a:ea typeface="+mn-ea"/>
+                <a:cs typeface="+mn-cs"/>
+              </a:defRPr>
+            </a:lvl4pPr>
+            <a:lvl5pPr marL="2057400" indent="-228600" algn="l" defTabSz="914400" rtl="0" eaLnBrk="1" latinLnBrk="0" hangingPunct="1">
+              <a:lnSpc>
+                <a:spcPct val="90000"/>
+              </a:lnSpc>
+              <a:spcBef>
+                <a:spcPts val="500"/>
+              </a:spcBef>
+              <a:buClr>
+                <a:schemeClr val="accent5"/>
+              </a:buClr>
+              <a:buFont typeface="Wingdings" panose="05000000000000000000" pitchFamily="2" charset="2"/>
+              <a:buChar char="§"/>
+              <a:defRPr sz="1800" kern="1200">
+                <a:solidFill>
+                  <a:schemeClr val="bg1"/>
+                </a:solidFill>
+                <a:latin typeface="+mn-lt"/>
+                <a:ea typeface="+mn-ea"/>
+                <a:cs typeface="+mn-cs"/>
+              </a:defRPr>
+            </a:lvl5pPr>
+            <a:lvl6pPr marL="2514600" indent="-228600" algn="l" defTabSz="914400" rtl="0" eaLnBrk="1" latinLnBrk="0" hangingPunct="1">
+              <a:lnSpc>
+                <a:spcPct val="90000"/>
+              </a:lnSpc>
+              <a:spcBef>
+                <a:spcPts val="500"/>
+              </a:spcBef>
+              <a:buFont typeface="Arial" panose="020B0604020202020204" pitchFamily="34" charset="0"/>
+              <a:buChar char="•"/>
+              <a:defRPr sz="1800" kern="1200">
+                <a:solidFill>
+                  <a:schemeClr val="tx1"/>
+                </a:solidFill>
+                <a:latin typeface="+mn-lt"/>
+                <a:ea typeface="+mn-ea"/>
+                <a:cs typeface="+mn-cs"/>
+              </a:defRPr>
+            </a:lvl6pPr>
+            <a:lvl7pPr marL="2971800" indent="-228600" algn="l" defTabSz="914400" rtl="0" eaLnBrk="1" latinLnBrk="0" hangingPunct="1">
+              <a:lnSpc>
+                <a:spcPct val="90000"/>
+              </a:lnSpc>
+              <a:spcBef>
+                <a:spcPts val="500"/>
+              </a:spcBef>
+              <a:buFont typeface="Arial" panose="020B0604020202020204" pitchFamily="34" charset="0"/>
+              <a:buChar char="•"/>
+              <a:defRPr sz="1800" kern="1200">
+                <a:solidFill>
+                  <a:schemeClr val="tx1"/>
+                </a:solidFill>
+                <a:latin typeface="+mn-lt"/>
+                <a:ea typeface="+mn-ea"/>
+                <a:cs typeface="+mn-cs"/>
+              </a:defRPr>
+            </a:lvl7pPr>
+            <a:lvl8pPr marL="3429000" indent="-228600" algn="l" defTabSz="914400" rtl="0" eaLnBrk="1" latinLnBrk="0" hangingPunct="1">
+              <a:lnSpc>
+                <a:spcPct val="90000"/>
+              </a:lnSpc>
+              <a:spcBef>
+                <a:spcPts val="500"/>
+              </a:spcBef>
+              <a:buFont typeface="Arial" panose="020B0604020202020204" pitchFamily="34" charset="0"/>
+              <a:buChar char="•"/>
+              <a:defRPr sz="1800" kern="1200">
+                <a:solidFill>
+                  <a:schemeClr val="tx1"/>
+                </a:solidFill>
+                <a:latin typeface="+mn-lt"/>
+                <a:ea typeface="+mn-ea"/>
+                <a:cs typeface="+mn-cs"/>
+              </a:defRPr>
+            </a:lvl8pPr>
+            <a:lvl9pPr marL="3886200" indent="-228600" algn="l" defTabSz="914400" rtl="0" eaLnBrk="1" latinLnBrk="0" hangingPunct="1">
+              <a:lnSpc>
+                <a:spcPct val="90000"/>
+              </a:lnSpc>
+              <a:spcBef>
+                <a:spcPts val="500"/>
+              </a:spcBef>
+              <a:buFont typeface="Arial" panose="020B0604020202020204" pitchFamily="34" charset="0"/>
+              <a:buChar char="•"/>
+              <a:defRPr sz="1800" kern="1200">
+                <a:solidFill>
+                  <a:schemeClr val="tx1"/>
+                </a:solidFill>
+                <a:latin typeface="+mn-lt"/>
+                <a:ea typeface="+mn-ea"/>
+                <a:cs typeface="+mn-cs"/>
+              </a:defRPr>
+            </a:lvl9pPr>
+          </a:lstStyle>
+          <a:p>
+            <a:r>
+              <a:rPr lang="en-US" dirty="0"/>
+              <a:t>The previous slides explored possible classification algorithms where our training data is already labeled.  Alternative data exploration projects may include clustering for anomaly detection</a:t>
+            </a:r>
+          </a:p>
+        </p:txBody>
+      </p:sp>
+    </p:spTree>
+    <p:extLst>
+      <p:ext uri="{BB962C8B-B14F-4D97-AF65-F5344CB8AC3E}">
+        <p14:creationId xmlns:p14="http://schemas.microsoft.com/office/powerpoint/2010/main" val="1340280693"/>
+      </p:ext>
+    </p:extLst>
+  </p:cSld>
+  <p:clrMapOvr>
+    <a:masterClrMapping/>
+  </p:clrMapOvr>
+</p:sld>
+</file>
+
+<file path=ppt/slides/slide14.xml><?xml version="1.0" encoding="utf-8"?>
+<p:sld xmlns:a="http://schemas.openxmlformats.org/drawingml/2006/main" xmlns:r="http://schemas.openxmlformats.org/officeDocument/2006/relationships" xmlns:p="http://schemas.openxmlformats.org/presentationml/2006/main">
+  <p:cSld>
+    <p:spTree>
+      <p:nvGrpSpPr>
+        <p:cNvPr id="1" name=""/>
+        <p:cNvGrpSpPr/>
+        <p:nvPr/>
+      </p:nvGrpSpPr>
+      <p:grpSpPr>
+        <a:xfrm>
+          <a:off x="0" y="0"/>
+          <a:ext cx="0" cy="0"/>
+          <a:chOff x="0" y="0"/>
+          <a:chExt cx="0" cy="0"/>
+        </a:xfrm>
+      </p:grpSpPr>
+      <p:sp>
+        <p:nvSpPr>
+          <p:cNvPr id="2" name="Title 1">
+            <a:extLst>
+              <a:ext uri="{FF2B5EF4-FFF2-40B4-BE49-F238E27FC236}">
+                <a16:creationId xmlns:a16="http://schemas.microsoft.com/office/drawing/2014/main" id="{4243BD5A-CCE5-8B3F-8BD4-786450B9BF0E}"/>
+              </a:ext>
+            </a:extLst>
+          </p:cNvPr>
+          <p:cNvSpPr>
+            <a:spLocks noGrp="1"/>
+          </p:cNvSpPr>
+          <p:nvPr>
+            <p:ph type="title"/>
+          </p:nvPr>
+        </p:nvSpPr>
+        <p:spPr>
+          <a:xfrm>
+            <a:off x="838199" y="160336"/>
+            <a:ext cx="10943745" cy="1325563"/>
+          </a:xfrm>
+        </p:spPr>
         <p:txBody>
           <a:bodyPr/>
           <a:lstStyle/>
           <a:p>
-            <a:endParaRPr lang="en-US"/>
+            <a:r>
+              <a:rPr lang="en-US" dirty="0"/>
+              <a:t>Assumptions, Challenges, Improvements</a:t>
+            </a:r>
+          </a:p>
+        </p:txBody>
+      </p:sp>
+      <p:sp>
+        <p:nvSpPr>
+          <p:cNvPr id="3" name="Content Placeholder 2">
+            <a:extLst>
+              <a:ext uri="{FF2B5EF4-FFF2-40B4-BE49-F238E27FC236}">
+                <a16:creationId xmlns:a16="http://schemas.microsoft.com/office/drawing/2014/main" id="{9C4246EB-E0C4-0874-58FD-DEF0A70E005A}"/>
+              </a:ext>
+            </a:extLst>
+          </p:cNvPr>
+          <p:cNvSpPr>
+            <a:spLocks noGrp="1"/>
+          </p:cNvSpPr>
+          <p:nvPr>
+            <p:ph idx="1"/>
+          </p:nvPr>
+        </p:nvSpPr>
+        <p:spPr/>
+        <p:txBody>
+          <a:bodyPr>
+            <a:normAutofit/>
+          </a:bodyPr>
+          <a:lstStyle/>
+          <a:p>
+            <a:r>
+              <a:rPr lang="en-US" sz="2400" dirty="0"/>
+              <a:t>The dataset is large as discussed (35k rows), and has many sparsely populated columns and rows.  Once filtered we may have a materially smaller “usable” dataset than initially thought.  Bootstrapping and Cross Validation methods will be needed for model fitting.</a:t>
+            </a:r>
+          </a:p>
+          <a:p>
+            <a:r>
+              <a:rPr lang="en-US" sz="2400" dirty="0"/>
+              <a:t>Many columns in the dataset take on discrete values beyond the binary (PHA/ Not PHA) classification problem which open up countless combinations for future clustering and classification problems</a:t>
+            </a:r>
           </a:p>
         </p:txBody>
       </p:sp>
@@ -6878,30 +7201,38 @@
           <a:p>
             <a:pPr lvl="2"/>
             <a:r>
-              <a:rPr lang="en-US" dirty="0" err="1"/>
-              <a:t>Pha</a:t>
-            </a:r>
-            <a:r>
               <a:rPr lang="en-US" dirty="0"/>
-              <a:t> – indicator for potentially hazardous asteroid</a:t>
+              <a:t>PHA – indicator for potentially hazardous asteroid</a:t>
             </a:r>
           </a:p>
           <a:p>
             <a:pPr lvl="2"/>
             <a:r>
-              <a:rPr lang="en-US" dirty="0" err="1"/>
-              <a:t>Moid</a:t>
-            </a:r>
-            <a:r>
               <a:rPr lang="en-US" dirty="0"/>
-              <a:t> –minimum distance between the orbits of Earth and the small-body (au)</a:t>
+              <a:t>MOID –minimum distance between the orbits of Earth and the small-body (au)</a:t>
             </a:r>
           </a:p>
           <a:p>
             <a:pPr lvl="2"/>
             <a:r>
               <a:rPr lang="en-US" dirty="0"/>
-              <a:t>Eccentricity - Eccentricity e is the ratio of half the distance between the foci c to the semi-major axis a: e=c/a. For example, an orbit with e=0 is circular, e=1 is parabolic, and e between 0 and 1 is elliptic. </a:t>
+              <a:t>Eccentricity - Eccentricity e is the ratio of half the distance between the foci </a:t>
+            </a:r>
+            <a:r>
+              <a:rPr lang="en-US" i="1" dirty="0"/>
+              <a:t>c</a:t>
+            </a:r>
+            <a:r>
+              <a:rPr lang="en-US" dirty="0"/>
+              <a:t> to the semi-major axis </a:t>
+            </a:r>
+            <a:r>
+              <a:rPr lang="en-US" i="1" dirty="0"/>
+              <a:t>a</a:t>
+            </a:r>
+            <a:r>
+              <a:rPr lang="en-US" dirty="0"/>
+              <a:t>: e=c/a. For example, an orbit with e=0 is circular, e=1 is parabolic, and e between 0 and 1 is elliptic. </a:t>
             </a:r>
           </a:p>
           <a:p>
@@ -7126,7 +7457,7 @@
           <a:p>
             <a:r>
               <a:rPr lang="en-US" dirty="0"/>
-              <a:t>To get a quick, if naïve, view of the potential predictive power of the dataset, we run Pearson’s correlation between all data elements and check if there are any clear trends </a:t>
+              <a:t>To get a quick, naïve, view of the potential predictive power of the dataset, we run Pearson’s correlation between all data elements and check if there are any clear trends </a:t>
             </a:r>
           </a:p>
           <a:p>
@@ -7217,7 +7548,7 @@
           <p:cNvPr id="2" name="Title 1">
             <a:extLst>
               <a:ext uri="{FF2B5EF4-FFF2-40B4-BE49-F238E27FC236}">
-                <a16:creationId xmlns:a16="http://schemas.microsoft.com/office/drawing/2014/main" id="{A88C9361-4F05-F26B-DDFC-BE1BB44291AD}"/>
+                <a16:creationId xmlns:a16="http://schemas.microsoft.com/office/drawing/2014/main" id="{C33F4ED6-95B6-45CA-9318-D5C6D107AB69}"/>
               </a:ext>
             </a:extLst>
           </p:cNvPr>
@@ -7231,7 +7562,7 @@
         <p:spPr>
           <a:xfrm>
             <a:off x="838200" y="160336"/>
-            <a:ext cx="10891118" cy="1325563"/>
+            <a:ext cx="10476678" cy="1325563"/>
           </a:xfrm>
         </p:spPr>
         <p:txBody>
@@ -7240,263 +7571,100 @@
           <a:p>
             <a:r>
               <a:rPr lang="en-US" dirty="0"/>
-              <a:t>Potential Classification Problems</a:t>
-            </a:r>
+              <a:t>Data Relationships</a:t>
+            </a:r>
+          </a:p>
+        </p:txBody>
+      </p:sp>
+      <p:sp>
+        <p:nvSpPr>
+          <p:cNvPr id="3" name="Content Placeholder 2">
+            <a:extLst>
+              <a:ext uri="{FF2B5EF4-FFF2-40B4-BE49-F238E27FC236}">
+                <a16:creationId xmlns:a16="http://schemas.microsoft.com/office/drawing/2014/main" id="{E84E5DA1-F8B9-4937-9464-997FD4F08F17}"/>
+              </a:ext>
+            </a:extLst>
+          </p:cNvPr>
+          <p:cNvSpPr>
+            <a:spLocks noGrp="1"/>
+          </p:cNvSpPr>
+          <p:nvPr>
+            <p:ph idx="1"/>
+          </p:nvPr>
+        </p:nvSpPr>
+        <p:spPr>
+          <a:xfrm>
+            <a:off x="6249241" y="1545196"/>
+            <a:ext cx="4244788" cy="4351338"/>
+          </a:xfrm>
+        </p:spPr>
+        <p:txBody>
+          <a:bodyPr>
+            <a:normAutofit lnSpcReduction="10000"/>
+          </a:bodyPr>
+          <a:lstStyle/>
+          <a:p>
+            <a:r>
+              <a:rPr lang="en-US" dirty="0"/>
+              <a:t>Many of the observed fields appear to follow “nice” distributions which we can work with</a:t>
+            </a:r>
+          </a:p>
+          <a:p>
+            <a:r>
+              <a:rPr lang="en-US" dirty="0"/>
+              <a:t>Building off of the previous slide, different variable combinations have weak to strong relationships with one </a:t>
+            </a:r>
+            <a:r>
+              <a:rPr lang="en-US"/>
+              <a:t>another which we can leverage</a:t>
+            </a:r>
+            <a:endParaRPr lang="en-US" dirty="0"/>
           </a:p>
         </p:txBody>
       </p:sp>
       <p:pic>
         <p:nvPicPr>
-          <p:cNvPr id="22" name="Content Placeholder 21">
-            <a:extLst>
-              <a:ext uri="{FF2B5EF4-FFF2-40B4-BE49-F238E27FC236}">
-                <a16:creationId xmlns:a16="http://schemas.microsoft.com/office/drawing/2014/main" id="{A1761F66-DA5A-69AD-0AFF-AD8035E5918F}"/>
+          <p:cNvPr id="4098" name="Picture 2">
+            <a:extLst>
+              <a:ext uri="{FF2B5EF4-FFF2-40B4-BE49-F238E27FC236}">
+                <a16:creationId xmlns:a16="http://schemas.microsoft.com/office/drawing/2014/main" id="{B9551BF8-42EA-1C13-3E30-2FA9C0F12109}"/>
               </a:ext>
             </a:extLst>
           </p:cNvPr>
           <p:cNvPicPr>
-            <a:picLocks noGrp="1" noChangeAspect="1"/>
+            <a:picLocks noChangeAspect="1" noChangeArrowheads="1"/>
           </p:cNvPicPr>
-          <p:nvPr>
-            <p:ph idx="1"/>
-          </p:nvPr>
+          <p:nvPr/>
         </p:nvPicPr>
         <p:blipFill>
           <a:blip r:embed="rId2"/>
-          <a:srcRect/>
+          <a:srcRect l="4953" r="4953"/>
           <a:stretch/>
         </p:blipFill>
-        <p:spPr>
+        <p:spPr bwMode="auto">
           <a:xfrm>
-            <a:off x="838200" y="2127250"/>
-            <a:ext cx="6246813" cy="3748087"/>
-          </a:xfrm>
-        </p:spPr>
-      </p:pic>
-      <p:sp>
-        <p:nvSpPr>
-          <p:cNvPr id="20" name="Content Placeholder 2">
-            <a:extLst>
-              <a:ext uri="{FF2B5EF4-FFF2-40B4-BE49-F238E27FC236}">
-                <a16:creationId xmlns:a16="http://schemas.microsoft.com/office/drawing/2014/main" id="{BA63EDEC-7C0C-D436-3396-7DA950F78EDD}"/>
-              </a:ext>
-            </a:extLst>
-          </p:cNvPr>
-          <p:cNvSpPr txBox="1">
-            <a:spLocks/>
-          </p:cNvSpPr>
-          <p:nvPr/>
-        </p:nvSpPr>
-        <p:spPr>
-          <a:xfrm>
-            <a:off x="7420199" y="1825625"/>
-            <a:ext cx="4244788" cy="4351338"/>
+            <a:off x="856129" y="1685269"/>
+            <a:ext cx="4953841" cy="4123860"/>
           </a:xfrm>
           <a:prstGeom prst="rect">
             <a:avLst/>
           </a:prstGeom>
+          <a:noFill/>
+          <a:extLst>
+            <a:ext uri="{909E8E84-426E-40DD-AFC4-6F175D3DCCD1}">
+              <a14:hiddenFill xmlns:a14="http://schemas.microsoft.com/office/drawing/2010/main">
+                <a:solidFill>
+                  <a:srgbClr val="FFFFFF"/>
+                </a:solidFill>
+              </a14:hiddenFill>
+            </a:ext>
+          </a:extLst>
         </p:spPr>
-        <p:txBody>
-          <a:bodyPr vert="horz" lIns="91440" tIns="45720" rIns="91440" bIns="45720" rtlCol="0">
-            <a:normAutofit/>
-          </a:bodyPr>
-          <a:lstStyle>
-            <a:lvl1pPr marL="228600" indent="-228600" algn="l" defTabSz="914400" rtl="0" eaLnBrk="1" latinLnBrk="0" hangingPunct="1">
-              <a:lnSpc>
-                <a:spcPct val="90000"/>
-              </a:lnSpc>
-              <a:spcBef>
-                <a:spcPts val="1000"/>
-              </a:spcBef>
-              <a:buClr>
-                <a:schemeClr val="accent5"/>
-              </a:buClr>
-              <a:buFont typeface="Wingdings" panose="05000000000000000000" pitchFamily="2" charset="2"/>
-              <a:buChar char="§"/>
-              <a:defRPr sz="2800" kern="1200">
-                <a:solidFill>
-                  <a:schemeClr val="bg1"/>
-                </a:solidFill>
-                <a:latin typeface="+mn-lt"/>
-                <a:ea typeface="+mn-ea"/>
-                <a:cs typeface="+mn-cs"/>
-              </a:defRPr>
-            </a:lvl1pPr>
-            <a:lvl2pPr marL="685800" indent="-228600" algn="l" defTabSz="914400" rtl="0" eaLnBrk="1" latinLnBrk="0" hangingPunct="1">
-              <a:lnSpc>
-                <a:spcPct val="90000"/>
-              </a:lnSpc>
-              <a:spcBef>
-                <a:spcPts val="500"/>
-              </a:spcBef>
-              <a:buClr>
-                <a:schemeClr val="accent5"/>
-              </a:buClr>
-              <a:buFont typeface="Wingdings" panose="05000000000000000000" pitchFamily="2" charset="2"/>
-              <a:buChar char="§"/>
-              <a:defRPr sz="2400" kern="1200">
-                <a:solidFill>
-                  <a:schemeClr val="bg1"/>
-                </a:solidFill>
-                <a:latin typeface="+mn-lt"/>
-                <a:ea typeface="+mn-ea"/>
-                <a:cs typeface="+mn-cs"/>
-              </a:defRPr>
-            </a:lvl2pPr>
-            <a:lvl3pPr marL="1143000" indent="-228600" algn="l" defTabSz="914400" rtl="0" eaLnBrk="1" latinLnBrk="0" hangingPunct="1">
-              <a:lnSpc>
-                <a:spcPct val="90000"/>
-              </a:lnSpc>
-              <a:spcBef>
-                <a:spcPts val="500"/>
-              </a:spcBef>
-              <a:buClr>
-                <a:schemeClr val="accent5"/>
-              </a:buClr>
-              <a:buFont typeface="Wingdings" panose="05000000000000000000" pitchFamily="2" charset="2"/>
-              <a:buChar char="§"/>
-              <a:defRPr sz="2000" kern="1200">
-                <a:solidFill>
-                  <a:schemeClr val="bg1"/>
-                </a:solidFill>
-                <a:latin typeface="+mn-lt"/>
-                <a:ea typeface="+mn-ea"/>
-                <a:cs typeface="+mn-cs"/>
-              </a:defRPr>
-            </a:lvl3pPr>
-            <a:lvl4pPr marL="1600200" indent="-228600" algn="l" defTabSz="914400" rtl="0" eaLnBrk="1" latinLnBrk="0" hangingPunct="1">
-              <a:lnSpc>
-                <a:spcPct val="90000"/>
-              </a:lnSpc>
-              <a:spcBef>
-                <a:spcPts val="500"/>
-              </a:spcBef>
-              <a:buClr>
-                <a:schemeClr val="accent5"/>
-              </a:buClr>
-              <a:buFont typeface="Wingdings" panose="05000000000000000000" pitchFamily="2" charset="2"/>
-              <a:buChar char="§"/>
-              <a:defRPr sz="1800" kern="1200">
-                <a:solidFill>
-                  <a:schemeClr val="bg1"/>
-                </a:solidFill>
-                <a:latin typeface="+mn-lt"/>
-                <a:ea typeface="+mn-ea"/>
-                <a:cs typeface="+mn-cs"/>
-              </a:defRPr>
-            </a:lvl4pPr>
-            <a:lvl5pPr marL="2057400" indent="-228600" algn="l" defTabSz="914400" rtl="0" eaLnBrk="1" latinLnBrk="0" hangingPunct="1">
-              <a:lnSpc>
-                <a:spcPct val="90000"/>
-              </a:lnSpc>
-              <a:spcBef>
-                <a:spcPts val="500"/>
-              </a:spcBef>
-              <a:buClr>
-                <a:schemeClr val="accent5"/>
-              </a:buClr>
-              <a:buFont typeface="Wingdings" panose="05000000000000000000" pitchFamily="2" charset="2"/>
-              <a:buChar char="§"/>
-              <a:defRPr sz="1800" kern="1200">
-                <a:solidFill>
-                  <a:schemeClr val="bg1"/>
-                </a:solidFill>
-                <a:latin typeface="+mn-lt"/>
-                <a:ea typeface="+mn-ea"/>
-                <a:cs typeface="+mn-cs"/>
-              </a:defRPr>
-            </a:lvl5pPr>
-            <a:lvl6pPr marL="2514600" indent="-228600" algn="l" defTabSz="914400" rtl="0" eaLnBrk="1" latinLnBrk="0" hangingPunct="1">
-              <a:lnSpc>
-                <a:spcPct val="90000"/>
-              </a:lnSpc>
-              <a:spcBef>
-                <a:spcPts val="500"/>
-              </a:spcBef>
-              <a:buFont typeface="Arial" panose="020B0604020202020204" pitchFamily="34" charset="0"/>
-              <a:buChar char="•"/>
-              <a:defRPr sz="1800" kern="1200">
-                <a:solidFill>
-                  <a:schemeClr val="tx1"/>
-                </a:solidFill>
-                <a:latin typeface="+mn-lt"/>
-                <a:ea typeface="+mn-ea"/>
-                <a:cs typeface="+mn-cs"/>
-              </a:defRPr>
-            </a:lvl6pPr>
-            <a:lvl7pPr marL="2971800" indent="-228600" algn="l" defTabSz="914400" rtl="0" eaLnBrk="1" latinLnBrk="0" hangingPunct="1">
-              <a:lnSpc>
-                <a:spcPct val="90000"/>
-              </a:lnSpc>
-              <a:spcBef>
-                <a:spcPts val="500"/>
-              </a:spcBef>
-              <a:buFont typeface="Arial" panose="020B0604020202020204" pitchFamily="34" charset="0"/>
-              <a:buChar char="•"/>
-              <a:defRPr sz="1800" kern="1200">
-                <a:solidFill>
-                  <a:schemeClr val="tx1"/>
-                </a:solidFill>
-                <a:latin typeface="+mn-lt"/>
-                <a:ea typeface="+mn-ea"/>
-                <a:cs typeface="+mn-cs"/>
-              </a:defRPr>
-            </a:lvl7pPr>
-            <a:lvl8pPr marL="3429000" indent="-228600" algn="l" defTabSz="914400" rtl="0" eaLnBrk="1" latinLnBrk="0" hangingPunct="1">
-              <a:lnSpc>
-                <a:spcPct val="90000"/>
-              </a:lnSpc>
-              <a:spcBef>
-                <a:spcPts val="500"/>
-              </a:spcBef>
-              <a:buFont typeface="Arial" panose="020B0604020202020204" pitchFamily="34" charset="0"/>
-              <a:buChar char="•"/>
-              <a:defRPr sz="1800" kern="1200">
-                <a:solidFill>
-                  <a:schemeClr val="tx1"/>
-                </a:solidFill>
-                <a:latin typeface="+mn-lt"/>
-                <a:ea typeface="+mn-ea"/>
-                <a:cs typeface="+mn-cs"/>
-              </a:defRPr>
-            </a:lvl8pPr>
-            <a:lvl9pPr marL="3886200" indent="-228600" algn="l" defTabSz="914400" rtl="0" eaLnBrk="1" latinLnBrk="0" hangingPunct="1">
-              <a:lnSpc>
-                <a:spcPct val="90000"/>
-              </a:lnSpc>
-              <a:spcBef>
-                <a:spcPts val="500"/>
-              </a:spcBef>
-              <a:buFont typeface="Arial" panose="020B0604020202020204" pitchFamily="34" charset="0"/>
-              <a:buChar char="•"/>
-              <a:defRPr sz="1800" kern="1200">
-                <a:solidFill>
-                  <a:schemeClr val="tx1"/>
-                </a:solidFill>
-                <a:latin typeface="+mn-lt"/>
-                <a:ea typeface="+mn-ea"/>
-                <a:cs typeface="+mn-cs"/>
-              </a:defRPr>
-            </a:lvl9pPr>
-          </a:lstStyle>
-          <a:p>
-            <a:r>
-              <a:rPr lang="en-US" dirty="0"/>
-              <a:t>Some combinations of variables show promising results for simple linear classification algorithms such as LDA and Logistic Regression</a:t>
-            </a:r>
-          </a:p>
-          <a:p>
-            <a:r>
-              <a:rPr lang="en-US" dirty="0"/>
-              <a:t>A scatterplot of Asteroid Eccentricity vs Absolute Magnitude appears to have a linear boundary</a:t>
-            </a:r>
-          </a:p>
-        </p:txBody>
-      </p:sp>
+      </p:pic>
     </p:spTree>
     <p:extLst>
       <p:ext uri="{BB962C8B-B14F-4D97-AF65-F5344CB8AC3E}">
-        <p14:creationId xmlns:p14="http://schemas.microsoft.com/office/powerpoint/2010/main" val="1728548069"/>
+        <p14:creationId xmlns:p14="http://schemas.microsoft.com/office/powerpoint/2010/main" val="2274463673"/>
       </p:ext>
     </p:extLst>
   </p:cSld>
@@ -7558,10 +7726,10 @@
       </p:sp>
       <p:pic>
         <p:nvPicPr>
-          <p:cNvPr id="4" name="Content Placeholder 3">
-            <a:extLst>
-              <a:ext uri="{FF2B5EF4-FFF2-40B4-BE49-F238E27FC236}">
-                <a16:creationId xmlns:a16="http://schemas.microsoft.com/office/drawing/2014/main" id="{8C18B36D-EC6F-BEA4-D679-4B9FA4F88FA3}"/>
+          <p:cNvPr id="22" name="Content Placeholder 21">
+            <a:extLst>
+              <a:ext uri="{FF2B5EF4-FFF2-40B4-BE49-F238E27FC236}">
+                <a16:creationId xmlns:a16="http://schemas.microsoft.com/office/drawing/2014/main" id="{A1761F66-DA5A-69AD-0AFF-AD8035E5918F}"/>
               </a:ext>
             </a:extLst>
           </p:cNvPr>
@@ -7793,13 +7961,13 @@
           <a:p>
             <a:r>
               <a:rPr lang="en-US" dirty="0"/>
-              <a:t>Other combinations of data appear to define non-linear boundaries between PHA classifications. </a:t>
+              <a:t>Some combinations of variables show promising results for simple linear classification algorithms such as LDA and Logistic Regression</a:t>
             </a:r>
           </a:p>
           <a:p>
             <a:r>
               <a:rPr lang="en-US" dirty="0"/>
-              <a:t>Non-linear models such as QDA may be able to separate PHAs</a:t>
+              <a:t>A scatterplot of Asteroid Eccentricity vs Absolute Magnitude appears to have a linear boundary</a:t>
             </a:r>
           </a:p>
         </p:txBody>
@@ -7807,7 +7975,7 @@
     </p:spTree>
     <p:extLst>
       <p:ext uri="{BB962C8B-B14F-4D97-AF65-F5344CB8AC3E}">
-        <p14:creationId xmlns:p14="http://schemas.microsoft.com/office/powerpoint/2010/main" val="2903172297"/>
+        <p14:creationId xmlns:p14="http://schemas.microsoft.com/office/powerpoint/2010/main" val="1728548069"/>
       </p:ext>
     </p:extLst>
   </p:cSld>

</xml_diff>